<commit_message>
ending page & character trust bar
</commit_message>
<xml_diff>
--- a/game_images/icon_pallate.pptx
+++ b/game_images/icon_pallate.pptx
@@ -7,8 +7,9 @@
   <p:sldIdLst>
     <p:sldId id="257" r:id="rId2"/>
     <p:sldId id="259" r:id="rId3"/>
-    <p:sldId id="258" r:id="rId4"/>
-    <p:sldId id="260" r:id="rId5"/>
+    <p:sldId id="261" r:id="rId4"/>
+    <p:sldId id="258" r:id="rId5"/>
+    <p:sldId id="260" r:id="rId6"/>
   </p:sldIdLst>
   <p:sldSz cx="12192000" cy="6858000"/>
   <p:notesSz cx="6858000" cy="9144000"/>
@@ -262,7 +263,7 @@
           <a:p>
             <a:fld id="{C4BFC1E1-97EB-4ACF-84F7-799493C3E995}" type="datetimeFigureOut">
               <a:rPr lang="en-US" smtClean="0"/>
-              <a:t>4/24/2024</a:t>
+              <a:t>6/17/2024</a:t>
             </a:fld>
             <a:endParaRPr lang="en-US"/>
           </a:p>
@@ -460,7 +461,7 @@
           <a:p>
             <a:fld id="{C4BFC1E1-97EB-4ACF-84F7-799493C3E995}" type="datetimeFigureOut">
               <a:rPr lang="en-US" smtClean="0"/>
-              <a:t>4/24/2024</a:t>
+              <a:t>6/17/2024</a:t>
             </a:fld>
             <a:endParaRPr lang="en-US"/>
           </a:p>
@@ -668,7 +669,7 @@
           <a:p>
             <a:fld id="{C4BFC1E1-97EB-4ACF-84F7-799493C3E995}" type="datetimeFigureOut">
               <a:rPr lang="en-US" smtClean="0"/>
-              <a:t>4/24/2024</a:t>
+              <a:t>6/17/2024</a:t>
             </a:fld>
             <a:endParaRPr lang="en-US"/>
           </a:p>
@@ -866,7 +867,7 @@
           <a:p>
             <a:fld id="{C4BFC1E1-97EB-4ACF-84F7-799493C3E995}" type="datetimeFigureOut">
               <a:rPr lang="en-US" smtClean="0"/>
-              <a:t>4/24/2024</a:t>
+              <a:t>6/17/2024</a:t>
             </a:fld>
             <a:endParaRPr lang="en-US"/>
           </a:p>
@@ -1141,7 +1142,7 @@
           <a:p>
             <a:fld id="{C4BFC1E1-97EB-4ACF-84F7-799493C3E995}" type="datetimeFigureOut">
               <a:rPr lang="en-US" smtClean="0"/>
-              <a:t>4/24/2024</a:t>
+              <a:t>6/17/2024</a:t>
             </a:fld>
             <a:endParaRPr lang="en-US"/>
           </a:p>
@@ -1406,7 +1407,7 @@
           <a:p>
             <a:fld id="{C4BFC1E1-97EB-4ACF-84F7-799493C3E995}" type="datetimeFigureOut">
               <a:rPr lang="en-US" smtClean="0"/>
-              <a:t>4/24/2024</a:t>
+              <a:t>6/17/2024</a:t>
             </a:fld>
             <a:endParaRPr lang="en-US"/>
           </a:p>
@@ -1818,7 +1819,7 @@
           <a:p>
             <a:fld id="{C4BFC1E1-97EB-4ACF-84F7-799493C3E995}" type="datetimeFigureOut">
               <a:rPr lang="en-US" smtClean="0"/>
-              <a:t>4/24/2024</a:t>
+              <a:t>6/17/2024</a:t>
             </a:fld>
             <a:endParaRPr lang="en-US"/>
           </a:p>
@@ -1959,7 +1960,7 @@
           <a:p>
             <a:fld id="{C4BFC1E1-97EB-4ACF-84F7-799493C3E995}" type="datetimeFigureOut">
               <a:rPr lang="en-US" smtClean="0"/>
-              <a:t>4/24/2024</a:t>
+              <a:t>6/17/2024</a:t>
             </a:fld>
             <a:endParaRPr lang="en-US"/>
           </a:p>
@@ -2072,7 +2073,7 @@
           <a:p>
             <a:fld id="{C4BFC1E1-97EB-4ACF-84F7-799493C3E995}" type="datetimeFigureOut">
               <a:rPr lang="en-US" smtClean="0"/>
-              <a:t>4/24/2024</a:t>
+              <a:t>6/17/2024</a:t>
             </a:fld>
             <a:endParaRPr lang="en-US"/>
           </a:p>
@@ -2383,7 +2384,7 @@
           <a:p>
             <a:fld id="{C4BFC1E1-97EB-4ACF-84F7-799493C3E995}" type="datetimeFigureOut">
               <a:rPr lang="en-US" smtClean="0"/>
-              <a:t>4/24/2024</a:t>
+              <a:t>6/17/2024</a:t>
             </a:fld>
             <a:endParaRPr lang="en-US"/>
           </a:p>
@@ -2671,7 +2672,7 @@
           <a:p>
             <a:fld id="{C4BFC1E1-97EB-4ACF-84F7-799493C3E995}" type="datetimeFigureOut">
               <a:rPr lang="en-US" smtClean="0"/>
-              <a:t>4/24/2024</a:t>
+              <a:t>6/17/2024</a:t>
             </a:fld>
             <a:endParaRPr lang="en-US"/>
           </a:p>
@@ -2912,7 +2913,7 @@
           <a:p>
             <a:fld id="{C4BFC1E1-97EB-4ACF-84F7-799493C3E995}" type="datetimeFigureOut">
               <a:rPr lang="en-US" smtClean="0"/>
-              <a:t>4/24/2024</a:t>
+              <a:t>6/17/2024</a:t>
             </a:fld>
             <a:endParaRPr lang="en-US"/>
           </a:p>
@@ -4557,6 +4558,460 @@
           <a:chExt cx="0" cy="0"/>
         </a:xfrm>
       </p:grpSpPr>
+      <p:grpSp>
+        <p:nvGrpSpPr>
+          <p:cNvPr id="8" name="Group 7">
+            <a:extLst>
+              <a:ext uri="{FF2B5EF4-FFF2-40B4-BE49-F238E27FC236}">
+                <a16:creationId xmlns:a16="http://schemas.microsoft.com/office/drawing/2014/main" id="{6CFB2CDD-F597-F684-BA21-9E3E4858D42B}"/>
+              </a:ext>
+            </a:extLst>
+          </p:cNvPr>
+          <p:cNvGrpSpPr/>
+          <p:nvPr/>
+        </p:nvGrpSpPr>
+        <p:grpSpPr>
+          <a:xfrm>
+            <a:off x="-72117" y="44981"/>
+            <a:ext cx="12350687" cy="2593287"/>
+            <a:chOff x="-245555" y="532352"/>
+            <a:chExt cx="12350687" cy="2593287"/>
+          </a:xfrm>
+        </p:grpSpPr>
+        <p:pic>
+          <p:nvPicPr>
+            <p:cNvPr id="6" name="Picture 5" descr="A group of gold stars&#10;&#10;Description automatically generated">
+              <a:extLst>
+                <a:ext uri="{FF2B5EF4-FFF2-40B4-BE49-F238E27FC236}">
+                  <a16:creationId xmlns:a16="http://schemas.microsoft.com/office/drawing/2014/main" id="{9E3FEC7B-B9A3-377E-17C7-BD53AE95222C}"/>
+                </a:ext>
+              </a:extLst>
+            </p:cNvPr>
+            <p:cNvPicPr>
+              <a:picLocks noChangeAspect="1"/>
+            </p:cNvPicPr>
+            <p:nvPr/>
+          </p:nvPicPr>
+          <p:blipFill>
+            <a:blip r:embed="rId2">
+              <a:extLst>
+                <a:ext uri="{28A0092B-C50C-407E-A947-70E740481C1C}">
+                  <a14:useLocalDpi xmlns:a14="http://schemas.microsoft.com/office/drawing/2010/main" val="0"/>
+                </a:ext>
+              </a:extLst>
+            </a:blip>
+            <a:stretch>
+              <a:fillRect/>
+            </a:stretch>
+          </p:blipFill>
+          <p:spPr>
+            <a:xfrm>
+              <a:off x="4292525" y="532352"/>
+              <a:ext cx="3260074" cy="1630037"/>
+            </a:xfrm>
+            <a:prstGeom prst="rect">
+              <a:avLst/>
+            </a:prstGeom>
+          </p:spPr>
+        </p:pic>
+        <p:sp>
+          <p:nvSpPr>
+            <p:cNvPr id="11" name="TextBox 10">
+              <a:extLst>
+                <a:ext uri="{FF2B5EF4-FFF2-40B4-BE49-F238E27FC236}">
+                  <a16:creationId xmlns:a16="http://schemas.microsoft.com/office/drawing/2014/main" id="{77622264-F39A-F328-6195-6D06F4FAAC19}"/>
+                </a:ext>
+              </a:extLst>
+            </p:cNvPr>
+            <p:cNvSpPr txBox="1"/>
+            <p:nvPr/>
+          </p:nvSpPr>
+          <p:spPr>
+            <a:xfrm>
+              <a:off x="4360320" y="2178368"/>
+              <a:ext cx="3153394" cy="830997"/>
+            </a:xfrm>
+            <a:prstGeom prst="rect">
+              <a:avLst/>
+            </a:prstGeom>
+            <a:noFill/>
+          </p:spPr>
+          <p:txBody>
+            <a:bodyPr wrap="square" rtlCol="0">
+              <a:spAutoFit/>
+            </a:bodyPr>
+            <a:lstStyle/>
+            <a:p>
+              <a:pPr algn="dist"/>
+              <a:r>
+                <a:rPr lang="en-US" sz="4800" b="1" dirty="0">
+                  <a:solidFill>
+                    <a:srgbClr val="613903"/>
+                  </a:solidFill>
+                  <a:latin typeface="Imprint MT Shadow" panose="04020605060303030202" pitchFamily="82" charset="0"/>
+                </a:rPr>
+                <a:t>Success!</a:t>
+              </a:r>
+            </a:p>
+          </p:txBody>
+        </p:sp>
+        <p:pic>
+          <p:nvPicPr>
+            <p:cNvPr id="5" name="Picture 2" descr="Divider PNGs for Free Download">
+              <a:extLst>
+                <a:ext uri="{FF2B5EF4-FFF2-40B4-BE49-F238E27FC236}">
+                  <a16:creationId xmlns:a16="http://schemas.microsoft.com/office/drawing/2014/main" id="{BD6B6E3E-1701-BA7A-B01B-E93F9FA66BB0}"/>
+                </a:ext>
+              </a:extLst>
+            </p:cNvPr>
+            <p:cNvPicPr>
+              <a:picLocks noChangeAspect="1" noChangeArrowheads="1"/>
+            </p:cNvPicPr>
+            <p:nvPr/>
+          </p:nvPicPr>
+          <p:blipFill rotWithShape="1">
+            <a:blip r:embed="rId3">
+              <a:extLst>
+                <a:ext uri="{BEBA8EAE-BF5A-486C-A8C5-ECC9F3942E4B}">
+                  <a14:imgProps xmlns:a14="http://schemas.microsoft.com/office/drawing/2010/main">
+                    <a14:imgLayer r:embed="rId4">
+                      <a14:imgEffect>
+                        <a14:colorTemperature colorTemp="9980"/>
+                      </a14:imgEffect>
+                      <a14:imgEffect>
+                        <a14:saturation sat="120000"/>
+                      </a14:imgEffect>
+                    </a14:imgLayer>
+                  </a14:imgProps>
+                </a:ext>
+                <a:ext uri="{28A0092B-C50C-407E-A947-70E740481C1C}">
+                  <a14:useLocalDpi xmlns:a14="http://schemas.microsoft.com/office/drawing/2010/main" val="0"/>
+                </a:ext>
+              </a:extLst>
+            </a:blip>
+            <a:srcRect t="32032" r="64737" b="32606"/>
+            <a:stretch/>
+          </p:blipFill>
+          <p:spPr bwMode="auto">
+            <a:xfrm>
+              <a:off x="-245555" y="2062095"/>
+              <a:ext cx="4360355" cy="1063544"/>
+            </a:xfrm>
+            <a:prstGeom prst="rect">
+              <a:avLst/>
+            </a:prstGeom>
+            <a:noFill/>
+            <a:extLst>
+              <a:ext uri="{909E8E84-426E-40DD-AFC4-6F175D3DCCD1}">
+                <a14:hiddenFill xmlns:a14="http://schemas.microsoft.com/office/drawing/2010/main">
+                  <a:solidFill>
+                    <a:srgbClr val="FFFFFF"/>
+                  </a:solidFill>
+                </a14:hiddenFill>
+              </a:ext>
+            </a:extLst>
+          </p:spPr>
+        </p:pic>
+        <p:pic>
+          <p:nvPicPr>
+            <p:cNvPr id="7" name="Picture 2" descr="Divider PNGs for Free Download">
+              <a:extLst>
+                <a:ext uri="{FF2B5EF4-FFF2-40B4-BE49-F238E27FC236}">
+                  <a16:creationId xmlns:a16="http://schemas.microsoft.com/office/drawing/2014/main" id="{05318F80-ADA2-3EFA-0837-328D21F5ACE3}"/>
+                </a:ext>
+              </a:extLst>
+            </p:cNvPr>
+            <p:cNvPicPr>
+              <a:picLocks noChangeAspect="1" noChangeArrowheads="1"/>
+            </p:cNvPicPr>
+            <p:nvPr/>
+          </p:nvPicPr>
+          <p:blipFill rotWithShape="1">
+            <a:blip r:embed="rId3">
+              <a:extLst>
+                <a:ext uri="{BEBA8EAE-BF5A-486C-A8C5-ECC9F3942E4B}">
+                  <a14:imgProps xmlns:a14="http://schemas.microsoft.com/office/drawing/2010/main">
+                    <a14:imgLayer r:embed="rId4">
+                      <a14:imgEffect>
+                        <a14:colorTemperature colorTemp="9980"/>
+                      </a14:imgEffect>
+                      <a14:imgEffect>
+                        <a14:saturation sat="120000"/>
+                      </a14:imgEffect>
+                    </a14:imgLayer>
+                  </a14:imgProps>
+                </a:ext>
+                <a:ext uri="{28A0092B-C50C-407E-A947-70E740481C1C}">
+                  <a14:useLocalDpi xmlns:a14="http://schemas.microsoft.com/office/drawing/2010/main" val="0"/>
+                </a:ext>
+              </a:extLst>
+            </a:blip>
+            <a:srcRect l="64737" t="32032" b="32606"/>
+            <a:stretch/>
+          </p:blipFill>
+          <p:spPr bwMode="auto">
+            <a:xfrm>
+              <a:off x="7744777" y="2062095"/>
+              <a:ext cx="4360355" cy="1063544"/>
+            </a:xfrm>
+            <a:prstGeom prst="rect">
+              <a:avLst/>
+            </a:prstGeom>
+            <a:noFill/>
+            <a:extLst>
+              <a:ext uri="{909E8E84-426E-40DD-AFC4-6F175D3DCCD1}">
+                <a14:hiddenFill xmlns:a14="http://schemas.microsoft.com/office/drawing/2010/main">
+                  <a:solidFill>
+                    <a:srgbClr val="FFFFFF"/>
+                  </a:solidFill>
+                </a14:hiddenFill>
+              </a:ext>
+            </a:extLst>
+          </p:spPr>
+        </p:pic>
+      </p:grpSp>
+      <p:grpSp>
+        <p:nvGrpSpPr>
+          <p:cNvPr id="14" name="Group 13">
+            <a:extLst>
+              <a:ext uri="{FF2B5EF4-FFF2-40B4-BE49-F238E27FC236}">
+                <a16:creationId xmlns:a16="http://schemas.microsoft.com/office/drawing/2014/main" id="{362B482B-06A0-D3FD-72B6-91CEB6458357}"/>
+              </a:ext>
+            </a:extLst>
+          </p:cNvPr>
+          <p:cNvGrpSpPr/>
+          <p:nvPr/>
+        </p:nvGrpSpPr>
+        <p:grpSpPr>
+          <a:xfrm>
+            <a:off x="-79344" y="3452656"/>
+            <a:ext cx="12350687" cy="2864531"/>
+            <a:chOff x="-79344" y="3452656"/>
+            <a:chExt cx="12350687" cy="2864531"/>
+          </a:xfrm>
+        </p:grpSpPr>
+        <p:pic>
+          <p:nvPicPr>
+            <p:cNvPr id="9" name="Picture 8" descr="A cloud with raindrops&#10;&#10;Description automatically generated">
+              <a:extLst>
+                <a:ext uri="{FF2B5EF4-FFF2-40B4-BE49-F238E27FC236}">
+                  <a16:creationId xmlns:a16="http://schemas.microsoft.com/office/drawing/2014/main" id="{CD4072EA-BD4F-7F86-D6A2-404890BBCE4A}"/>
+                </a:ext>
+              </a:extLst>
+            </p:cNvPr>
+            <p:cNvPicPr>
+              <a:picLocks noChangeAspect="1"/>
+            </p:cNvPicPr>
+            <p:nvPr/>
+          </p:nvPicPr>
+          <p:blipFill>
+            <a:blip r:embed="rId5">
+              <a:extLst>
+                <a:ext uri="{28A0092B-C50C-407E-A947-70E740481C1C}">
+                  <a14:useLocalDpi xmlns:a14="http://schemas.microsoft.com/office/drawing/2010/main" val="0"/>
+                </a:ext>
+              </a:extLst>
+            </a:blip>
+            <a:stretch>
+              <a:fillRect/>
+            </a:stretch>
+          </p:blipFill>
+          <p:spPr>
+            <a:xfrm>
+              <a:off x="4647162" y="3452656"/>
+              <a:ext cx="2897675" cy="2140187"/>
+            </a:xfrm>
+            <a:prstGeom prst="rect">
+              <a:avLst/>
+            </a:prstGeom>
+          </p:spPr>
+        </p:pic>
+        <p:sp>
+          <p:nvSpPr>
+            <p:cNvPr id="10" name="TextBox 9">
+              <a:extLst>
+                <a:ext uri="{FF2B5EF4-FFF2-40B4-BE49-F238E27FC236}">
+                  <a16:creationId xmlns:a16="http://schemas.microsoft.com/office/drawing/2014/main" id="{772BCC6B-4D3E-38EF-52FD-A45D486F7E7A}"/>
+                </a:ext>
+              </a:extLst>
+            </p:cNvPr>
+            <p:cNvSpPr txBox="1"/>
+            <p:nvPr/>
+          </p:nvSpPr>
+          <p:spPr>
+            <a:xfrm>
+              <a:off x="4755453" y="5369916"/>
+              <a:ext cx="2695549" cy="830997"/>
+            </a:xfrm>
+            <a:prstGeom prst="rect">
+              <a:avLst/>
+            </a:prstGeom>
+            <a:noFill/>
+          </p:spPr>
+          <p:txBody>
+            <a:bodyPr wrap="square" rtlCol="0">
+              <a:spAutoFit/>
+            </a:bodyPr>
+            <a:lstStyle/>
+            <a:p>
+              <a:pPr algn="dist"/>
+              <a:r>
+                <a:rPr lang="en-US" sz="4800" b="1" dirty="0">
+                  <a:solidFill>
+                    <a:srgbClr val="613903"/>
+                  </a:solidFill>
+                  <a:latin typeface="Imprint MT Shadow" panose="04020605060303030202" pitchFamily="82" charset="0"/>
+                </a:rPr>
+                <a:t>Failed!</a:t>
+              </a:r>
+            </a:p>
+          </p:txBody>
+        </p:sp>
+        <p:pic>
+          <p:nvPicPr>
+            <p:cNvPr id="12" name="Picture 2" descr="Divider PNGs for Free Download">
+              <a:extLst>
+                <a:ext uri="{FF2B5EF4-FFF2-40B4-BE49-F238E27FC236}">
+                  <a16:creationId xmlns:a16="http://schemas.microsoft.com/office/drawing/2014/main" id="{930B872D-9356-2578-B5D2-2D83EFF3C644}"/>
+                </a:ext>
+              </a:extLst>
+            </p:cNvPr>
+            <p:cNvPicPr>
+              <a:picLocks noChangeAspect="1" noChangeArrowheads="1"/>
+            </p:cNvPicPr>
+            <p:nvPr/>
+          </p:nvPicPr>
+          <p:blipFill rotWithShape="1">
+            <a:blip r:embed="rId3">
+              <a:extLst>
+                <a:ext uri="{BEBA8EAE-BF5A-486C-A8C5-ECC9F3942E4B}">
+                  <a14:imgProps xmlns:a14="http://schemas.microsoft.com/office/drawing/2010/main">
+                    <a14:imgLayer r:embed="rId4">
+                      <a14:imgEffect>
+                        <a14:colorTemperature colorTemp="9980"/>
+                      </a14:imgEffect>
+                      <a14:imgEffect>
+                        <a14:saturation sat="120000"/>
+                      </a14:imgEffect>
+                    </a14:imgLayer>
+                  </a14:imgProps>
+                </a:ext>
+                <a:ext uri="{28A0092B-C50C-407E-A947-70E740481C1C}">
+                  <a14:useLocalDpi xmlns:a14="http://schemas.microsoft.com/office/drawing/2010/main" val="0"/>
+                </a:ext>
+              </a:extLst>
+            </a:blip>
+            <a:srcRect t="32032" r="64737" b="32606"/>
+            <a:stretch/>
+          </p:blipFill>
+          <p:spPr bwMode="auto">
+            <a:xfrm>
+              <a:off x="-79344" y="5253643"/>
+              <a:ext cx="4360355" cy="1063544"/>
+            </a:xfrm>
+            <a:prstGeom prst="rect">
+              <a:avLst/>
+            </a:prstGeom>
+            <a:noFill/>
+            <a:extLst>
+              <a:ext uri="{909E8E84-426E-40DD-AFC4-6F175D3DCCD1}">
+                <a14:hiddenFill xmlns:a14="http://schemas.microsoft.com/office/drawing/2010/main">
+                  <a:solidFill>
+                    <a:srgbClr val="FFFFFF"/>
+                  </a:solidFill>
+                </a14:hiddenFill>
+              </a:ext>
+            </a:extLst>
+          </p:spPr>
+        </p:pic>
+        <p:pic>
+          <p:nvPicPr>
+            <p:cNvPr id="13" name="Picture 2" descr="Divider PNGs for Free Download">
+              <a:extLst>
+                <a:ext uri="{FF2B5EF4-FFF2-40B4-BE49-F238E27FC236}">
+                  <a16:creationId xmlns:a16="http://schemas.microsoft.com/office/drawing/2014/main" id="{5B6571F0-0C93-34F8-6E2F-E699B138AA16}"/>
+                </a:ext>
+              </a:extLst>
+            </p:cNvPr>
+            <p:cNvPicPr>
+              <a:picLocks noChangeAspect="1" noChangeArrowheads="1"/>
+            </p:cNvPicPr>
+            <p:nvPr/>
+          </p:nvPicPr>
+          <p:blipFill rotWithShape="1">
+            <a:blip r:embed="rId3">
+              <a:extLst>
+                <a:ext uri="{BEBA8EAE-BF5A-486C-A8C5-ECC9F3942E4B}">
+                  <a14:imgProps xmlns:a14="http://schemas.microsoft.com/office/drawing/2010/main">
+                    <a14:imgLayer r:embed="rId4">
+                      <a14:imgEffect>
+                        <a14:colorTemperature colorTemp="9980"/>
+                      </a14:imgEffect>
+                      <a14:imgEffect>
+                        <a14:saturation sat="120000"/>
+                      </a14:imgEffect>
+                    </a14:imgLayer>
+                  </a14:imgProps>
+                </a:ext>
+                <a:ext uri="{28A0092B-C50C-407E-A947-70E740481C1C}">
+                  <a14:useLocalDpi xmlns:a14="http://schemas.microsoft.com/office/drawing/2010/main" val="0"/>
+                </a:ext>
+              </a:extLst>
+            </a:blip>
+            <a:srcRect l="64737" t="32032" b="32606"/>
+            <a:stretch/>
+          </p:blipFill>
+          <p:spPr bwMode="auto">
+            <a:xfrm>
+              <a:off x="7910988" y="5253643"/>
+              <a:ext cx="4360355" cy="1063544"/>
+            </a:xfrm>
+            <a:prstGeom prst="rect">
+              <a:avLst/>
+            </a:prstGeom>
+            <a:noFill/>
+            <a:extLst>
+              <a:ext uri="{909E8E84-426E-40DD-AFC4-6F175D3DCCD1}">
+                <a14:hiddenFill xmlns:a14="http://schemas.microsoft.com/office/drawing/2010/main">
+                  <a:solidFill>
+                    <a:srgbClr val="FFFFFF"/>
+                  </a:solidFill>
+                </a14:hiddenFill>
+              </a:ext>
+            </a:extLst>
+          </p:spPr>
+        </p:pic>
+      </p:grpSp>
+    </p:spTree>
+    <p:extLst>
+      <p:ext uri="{BB962C8B-B14F-4D97-AF65-F5344CB8AC3E}">
+        <p14:creationId xmlns:p14="http://schemas.microsoft.com/office/powerpoint/2010/main" val="3879526158"/>
+      </p:ext>
+    </p:extLst>
+  </p:cSld>
+  <p:clrMapOvr>
+    <a:masterClrMapping/>
+  </p:clrMapOvr>
+</p:sld>
+</file>
+
+<file path=ppt/slides/slide4.xml><?xml version="1.0" encoding="utf-8"?>
+<p:sld xmlns:a="http://schemas.openxmlformats.org/drawingml/2006/main" xmlns:r="http://schemas.openxmlformats.org/officeDocument/2006/relationships" xmlns:p="http://schemas.openxmlformats.org/presentationml/2006/main">
+  <p:cSld>
+    <p:spTree>
+      <p:nvGrpSpPr>
+        <p:cNvPr id="1" name=""/>
+        <p:cNvGrpSpPr/>
+        <p:nvPr/>
+      </p:nvGrpSpPr>
+      <p:grpSpPr>
+        <a:xfrm>
+          <a:off x="0" y="0"/>
+          <a:ext cx="0" cy="0"/>
+          <a:chOff x="0" y="0"/>
+          <a:chExt cx="0" cy="0"/>
+        </a:xfrm>
+      </p:grpSpPr>
       <p:pic>
         <p:nvPicPr>
           <p:cNvPr id="5" name="Picture 4">
@@ -4861,7 +5316,7 @@
 </p:sld>
 </file>
 
-<file path=ppt/slides/slide4.xml><?xml version="1.0" encoding="utf-8"?>
+<file path=ppt/slides/slide5.xml><?xml version="1.0" encoding="utf-8"?>
 <p:sld xmlns:a="http://schemas.openxmlformats.org/drawingml/2006/main" xmlns:r="http://schemas.openxmlformats.org/officeDocument/2006/relationships" xmlns:p="http://schemas.openxmlformats.org/presentationml/2006/main">
   <p:cSld>
     <p:spTree>

</xml_diff>